<commit_message>
create folder for android project
</commit_message>
<xml_diff>
--- a/Documentos/Status Report/status-report-grupo5.pptx
+++ b/Documentos/Status Report/status-report-grupo5.pptx
@@ -6674,8 +6674,8 @@
         </p:nvSpPr>
         <p:spPr>
           <a:xfrm>
-            <a:off x="6814440" y="1106640"/>
-            <a:ext cx="6194160" cy="2235240"/>
+            <a:off x="6814440" y="1106639"/>
+            <a:ext cx="6194160" cy="3260966"/>
           </a:xfrm>
           <a:prstGeom prst="rect">
             <a:avLst/>
@@ -6854,7 +6854,7 @@
             <a:avLst/>
           </a:prstGeom>
           <a:solidFill>
-            <a:srgbClr val="FFFF00"/>
+            <a:srgbClr val="1BCF13"/>
           </a:solidFill>
           <a:ln w="12600">
             <a:solidFill>
@@ -7281,7 +7281,7 @@
         </p:nvSpPr>
         <p:spPr>
           <a:xfrm>
-            <a:off x="507600" y="3418920"/>
+            <a:off x="507600" y="4837025"/>
             <a:ext cx="12504960" cy="237600"/>
           </a:xfrm>
           <a:prstGeom prst="rect">
@@ -7343,8 +7343,8 @@
         </p:nvSpPr>
         <p:spPr>
           <a:xfrm>
-            <a:off x="507600" y="1106640"/>
-            <a:ext cx="6175080" cy="2235240"/>
+            <a:off x="507600" y="1106639"/>
+            <a:ext cx="6175080" cy="3260966"/>
           </a:xfrm>
           <a:prstGeom prst="rect">
             <a:avLst/>
@@ -7582,10 +7582,171 @@
             </a:r>
           </a:p>
           <a:p>
-            <a:pPr>
-              <a:lnSpc>
-                <a:spcPct val="100000"/>
-              </a:lnSpc>
+            <a:pPr marL="252000" indent="-251280">
+              <a:buClr>
+                <a:srgbClr val="000000"/>
+              </a:buClr>
+              <a:buFont typeface="Wingdings" charset="2"/>
+              <a:buChar char=""/>
+            </a:pPr>
+            <a:r>
+              <a:rPr lang="pt-BR" sz="1330" b="1" strike="noStrike" spc="-1" dirty="0">
+                <a:solidFill>
+                  <a:srgbClr val="000000"/>
+                </a:solidFill>
+                <a:latin typeface="Exo 2 Medium"/>
+              </a:rPr>
+              <a:t>Prototipação das telas #André </a:t>
+            </a:r>
+            <a:endParaRPr lang="pt-BR" sz="1330" b="1" strike="noStrike" spc="-1" dirty="0">
+              <a:latin typeface="Arial"/>
+            </a:endParaRPr>
+          </a:p>
+          <a:p>
+            <a:pPr marL="252000" indent="-251280">
+              <a:buClr>
+                <a:srgbClr val="000000"/>
+              </a:buClr>
+              <a:buFont typeface="Wingdings" charset="2"/>
+              <a:buChar char=""/>
+            </a:pPr>
+            <a:r>
+              <a:rPr lang="pt-BR" sz="1400" b="1" strike="noStrike" spc="-1" dirty="0">
+                <a:solidFill>
+                  <a:srgbClr val="000000"/>
+                </a:solidFill>
+                <a:latin typeface="Exo 2 Medium"/>
+              </a:rPr>
+              <a:t>Arquitetura de Solução # Grupo</a:t>
+            </a:r>
+          </a:p>
+          <a:p>
+            <a:pPr marL="252000" indent="-251280">
+              <a:buClr>
+                <a:srgbClr val="000000"/>
+              </a:buClr>
+              <a:buFont typeface="Wingdings" charset="2"/>
+              <a:buChar char=""/>
+            </a:pPr>
+            <a:r>
+              <a:rPr lang="pt-BR" sz="1400" b="1" strike="noStrike" spc="-1" dirty="0">
+                <a:solidFill>
+                  <a:srgbClr val="000000"/>
+                </a:solidFill>
+                <a:latin typeface="Exo 2 Medium"/>
+              </a:rPr>
+              <a:t>Criação do FAQ # Grupo</a:t>
+            </a:r>
+          </a:p>
+          <a:p>
+            <a:pPr marL="252000" indent="-251280">
+              <a:buClr>
+                <a:srgbClr val="000000"/>
+              </a:buClr>
+              <a:buFont typeface="Wingdings" charset="2"/>
+              <a:buChar char=""/>
+            </a:pPr>
+            <a:r>
+              <a:rPr lang="pt-BR" sz="1400" b="1" strike="noStrike" spc="-1" dirty="0">
+                <a:solidFill>
+                  <a:srgbClr val="000000"/>
+                </a:solidFill>
+                <a:latin typeface="Exo 2 Medium"/>
+              </a:rPr>
+              <a:t>Análise de concorrentes # Grupo</a:t>
+            </a:r>
+          </a:p>
+          <a:p>
+            <a:pPr marL="252000" indent="-251280">
+              <a:buClr>
+                <a:srgbClr val="000000"/>
+              </a:buClr>
+              <a:buFont typeface="Wingdings" charset="2"/>
+              <a:buChar char=""/>
+            </a:pPr>
+            <a:r>
+              <a:rPr lang="pt-BR" sz="1400" b="1" strike="noStrike" spc="-1" dirty="0">
+                <a:solidFill>
+                  <a:srgbClr val="000000"/>
+                </a:solidFill>
+                <a:latin typeface="Exo 2 Medium"/>
+              </a:rPr>
+              <a:t>Criação de missão, visão e valores # Grupo</a:t>
+            </a:r>
+          </a:p>
+          <a:p>
+            <a:pPr marL="252000" indent="-251280">
+              <a:buClr>
+                <a:srgbClr val="000000"/>
+              </a:buClr>
+              <a:buFont typeface="Wingdings" charset="2"/>
+              <a:buChar char=""/>
+            </a:pPr>
+            <a:r>
+              <a:rPr lang="pt-BR" sz="1400" b="1" strike="noStrike" spc="-1" dirty="0">
+                <a:solidFill>
+                  <a:srgbClr val="000000"/>
+                </a:solidFill>
+                <a:latin typeface="Exo 2 Medium"/>
+              </a:rPr>
+              <a:t>Mapa Freq. Uso X Lucr</a:t>
+            </a:r>
+            <a:r>
+              <a:rPr lang="pt-BR" sz="1400" b="1" spc="-1" dirty="0">
+                <a:solidFill>
+                  <a:srgbClr val="000000"/>
+                </a:solidFill>
+                <a:latin typeface="Exo 2 Medium"/>
+              </a:rPr>
+              <a:t>o # </a:t>
+            </a:r>
+            <a:r>
+              <a:rPr lang="pt-BR" sz="1400" b="1" spc="-1" dirty="0" err="1">
+                <a:solidFill>
+                  <a:srgbClr val="000000"/>
+                </a:solidFill>
+                <a:latin typeface="Exo 2 Medium"/>
+              </a:rPr>
+              <a:t>Kling</a:t>
+            </a:r>
+            <a:r>
+              <a:rPr lang="pt-BR" sz="1400" b="1" spc="-1" dirty="0">
+                <a:solidFill>
+                  <a:srgbClr val="000000"/>
+                </a:solidFill>
+                <a:latin typeface="Exo 2 Medium"/>
+              </a:rPr>
+              <a:t> e Guilherme</a:t>
+            </a:r>
+            <a:endParaRPr lang="pt-BR" sz="1400" b="1" strike="noStrike" spc="-1" dirty="0">
+              <a:solidFill>
+                <a:srgbClr val="000000"/>
+              </a:solidFill>
+              <a:latin typeface="Exo 2 Medium"/>
+            </a:endParaRPr>
+          </a:p>
+          <a:p>
+            <a:pPr marL="252000" indent="-251280">
+              <a:buClr>
+                <a:srgbClr val="000000"/>
+              </a:buClr>
+              <a:buFont typeface="Wingdings" charset="2"/>
+              <a:buChar char=""/>
+            </a:pPr>
+            <a:endParaRPr lang="pt-BR" sz="1400" b="1" strike="noStrike" spc="-1" dirty="0">
+              <a:solidFill>
+                <a:srgbClr val="000000"/>
+              </a:solidFill>
+              <a:latin typeface="Exo 2 Medium"/>
+            </a:endParaRPr>
+          </a:p>
+          <a:p>
+            <a:pPr marL="252000" indent="-251280">
+              <a:buClr>
+                <a:srgbClr val="000000"/>
+              </a:buClr>
+              <a:buFont typeface="Wingdings" charset="2"/>
+              <a:buChar char=""/>
             </a:pPr>
             <a:endParaRPr lang="pt-BR" sz="1330" b="0" strike="noStrike" spc="-1" dirty="0">
               <a:latin typeface="Arial"/>
@@ -7642,13 +7803,13 @@
           <p:nvPr>
             <p:extLst>
               <p:ext uri="{D42A27DB-BD31-4B8C-83A1-F6EECF244321}">
-                <p14:modId xmlns:p14="http://schemas.microsoft.com/office/powerpoint/2010/main" val="1268338582"/>
+                <p14:modId xmlns:p14="http://schemas.microsoft.com/office/powerpoint/2010/main" val="3121957795"/>
               </p:ext>
             </p:extLst>
           </p:nvPr>
         </p:nvGraphicFramePr>
         <p:xfrm>
-          <a:off x="507600" y="3829798"/>
+          <a:off x="507600" y="5247903"/>
           <a:ext cx="12501000" cy="2103840"/>
         </p:xfrm>
         <a:graphic>
@@ -7717,8 +7878,23 @@
                           </a:solidFill>
                           <a:latin typeface="Exo 2 Medium"/>
                         </a:rPr>
-                        <a:t>Criação do banco de dados #Kling</a:t>
+                        <a:t>Criação do banco de dados # </a:t>
                       </a:r>
+                      <a:r>
+                        <a:rPr lang="pt-BR" sz="1330" b="0" strike="noStrike" spc="-1" dirty="0" err="1">
+                          <a:solidFill>
+                            <a:srgbClr val="000000"/>
+                          </a:solidFill>
+                          <a:latin typeface="Exo 2 Medium"/>
+                        </a:rPr>
+                        <a:t>Kling</a:t>
+                      </a:r>
+                      <a:endParaRPr lang="pt-BR" sz="1330" b="0" strike="noStrike" spc="-1" dirty="0">
+                        <a:solidFill>
+                          <a:srgbClr val="000000"/>
+                        </a:solidFill>
+                        <a:latin typeface="Exo 2 Medium"/>
+                      </a:endParaRPr>
                     </a:p>
                     <a:p>
                       <a:pPr marL="180000" indent="0">
@@ -7745,7 +7921,7 @@
                           </a:solidFill>
                           <a:latin typeface="Exo 2 Medium"/>
                         </a:rPr>
-                        <a:t>     Frente </a:t>
+                        <a:t>     Frente Back-</a:t>
                       </a:r>
                       <a:r>
                         <a:rPr lang="pt-BR" sz="1330" b="1" strike="noStrike" spc="-1" dirty="0" err="1">
@@ -7754,7 +7930,7 @@
                           </a:solidFill>
                           <a:latin typeface="Exo 2 Medium"/>
                         </a:rPr>
-                        <a:t>Backend</a:t>
+                        <a:t>end</a:t>
                       </a:r>
                       <a:endParaRPr lang="pt-BR" sz="1330" b="1" strike="noStrike" spc="-1" dirty="0">
                         <a:solidFill>
@@ -7790,7 +7966,7 @@
                           </a:solidFill>
                           <a:latin typeface="Exo 2 Medium"/>
                         </a:rPr>
-                        <a:t>Frente Front </a:t>
+                        <a:t>Frente Front-</a:t>
                       </a:r>
                       <a:r>
                         <a:rPr lang="pt-BR" sz="1330" b="1" strike="noStrike" spc="-1" dirty="0" err="1">
@@ -7802,41 +7978,56 @@
                         <a:t>end</a:t>
                       </a:r>
                       <a:endParaRPr lang="pt-BR" sz="1330" b="0" strike="noStrike" spc="-1" dirty="0">
+                        <a:solidFill>
+                          <a:srgbClr val="000000"/>
+                        </a:solidFill>
                         <a:latin typeface="Arial"/>
                       </a:endParaRPr>
                     </a:p>
                     <a:p>
-                      <a:pPr marL="432000" lvl="1" indent="-251280">
+                      <a:pPr marL="432000" lvl="1" indent="-252000" algn="l" defTabSz="914400" rtl="0" eaLnBrk="1" latinLnBrk="0" hangingPunct="1">
                         <a:lnSpc>
                           <a:spcPct val="100000"/>
                         </a:lnSpc>
                         <a:buClr>
                           <a:srgbClr val="000000"/>
                         </a:buClr>
-                        <a:buFont typeface="Wingdings" charset="2"/>
-                        <a:buChar char=""/>
+                        <a:buFont typeface="Arial" panose="020B0604020202020204" pitchFamily="34" charset="0"/>
+                        <a:buChar char="•"/>
                       </a:pPr>
                       <a:r>
-                        <a:rPr lang="pt-BR" sz="1330" b="0" strike="noStrike" spc="-1" dirty="0">
+                        <a:rPr lang="pt-BR" sz="1330" b="0" strike="noStrike" kern="1200" spc="-1" dirty="0">
                           <a:solidFill>
                             <a:srgbClr val="000000"/>
                           </a:solidFill>
                           <a:latin typeface="Exo 2 Medium"/>
+                          <a:ea typeface="+mn-ea"/>
+                          <a:cs typeface="+mn-cs"/>
                         </a:rPr>
-                        <a:t>Prototipação das telas #André</a:t>
+                        <a:t>Criação das telas </a:t>
                       </a:r>
                       <a:r>
-                        <a:rPr lang="pt-BR" sz="1330" b="1" strike="noStrike" spc="-1" dirty="0">
+                        <a:rPr lang="pt-BR" sz="1330" b="0" strike="noStrike" kern="1200" spc="-1" dirty="0" err="1">
                           <a:solidFill>
                             <a:srgbClr val="000000"/>
                           </a:solidFill>
                           <a:latin typeface="Exo 2 Medium"/>
+                          <a:ea typeface="+mn-ea"/>
+                          <a:cs typeface="+mn-cs"/>
                         </a:rPr>
-                        <a:t> </a:t>
+                        <a:t>prototipadas</a:t>
                       </a:r>
-                      <a:endParaRPr lang="pt-BR" sz="1330" b="0" strike="noStrike" spc="-1" dirty="0">
-                        <a:latin typeface="Arial"/>
-                      </a:endParaRPr>
+                      <a:r>
+                        <a:rPr lang="pt-BR" sz="1330" b="0" strike="noStrike" kern="1200" spc="-1" dirty="0">
+                          <a:solidFill>
+                            <a:srgbClr val="000000"/>
+                          </a:solidFill>
+                          <a:latin typeface="Exo 2 Medium"/>
+                          <a:ea typeface="+mn-ea"/>
+                          <a:cs typeface="+mn-cs"/>
+                        </a:rPr>
+                        <a:t> # Grupo</a:t>
+                      </a:r>
                     </a:p>
                   </a:txBody>
                   <a:tcPr>
@@ -7877,90 +8068,6 @@
                         <a:buFont typeface="Wingdings" charset="2"/>
                         <a:buChar char=""/>
                       </a:pPr>
-                      <a:r>
-                        <a:rPr lang="pt-BR" sz="1320" b="0" strike="noStrike" spc="-1" dirty="0">
-                          <a:solidFill>
-                            <a:srgbClr val="000000"/>
-                          </a:solidFill>
-                          <a:latin typeface="Exo 2 Medium"/>
-                        </a:rPr>
-                        <a:t>Criação do FAQ # Grupo</a:t>
-                      </a:r>
-                    </a:p>
-                    <a:p>
-                      <a:pPr marL="432000" lvl="1" indent="-251280">
-                        <a:lnSpc>
-                          <a:spcPct val="100000"/>
-                        </a:lnSpc>
-                        <a:buClr>
-                          <a:srgbClr val="000000"/>
-                        </a:buClr>
-                        <a:buFont typeface="Wingdings" charset="2"/>
-                        <a:buChar char=""/>
-                      </a:pPr>
-                      <a:r>
-                        <a:rPr lang="pt-BR" sz="1320" b="0" strike="noStrike" spc="-1" dirty="0">
-                          <a:solidFill>
-                            <a:srgbClr val="000000"/>
-                          </a:solidFill>
-                          <a:latin typeface="Exo 2 Medium"/>
-                        </a:rPr>
-                        <a:t>Arquitetura de Solução # Grupo</a:t>
-                      </a:r>
-                    </a:p>
-                    <a:p>
-                      <a:pPr marL="432000" lvl="1" indent="-251280">
-                        <a:lnSpc>
-                          <a:spcPct val="100000"/>
-                        </a:lnSpc>
-                        <a:buClr>
-                          <a:srgbClr val="000000"/>
-                        </a:buClr>
-                        <a:buFont typeface="Wingdings" charset="2"/>
-                        <a:buChar char=""/>
-                      </a:pPr>
-                      <a:r>
-                        <a:rPr lang="pt-BR" sz="1320" b="0" strike="noStrike" spc="-1" dirty="0">
-                          <a:solidFill>
-                            <a:srgbClr val="000000"/>
-                          </a:solidFill>
-                          <a:latin typeface="Exo 2 Medium"/>
-                        </a:rPr>
-                        <a:t>Análise de concorrentes # Grupo</a:t>
-                      </a:r>
-                    </a:p>
-                    <a:p>
-                      <a:pPr marL="432000" lvl="1" indent="-251280">
-                        <a:lnSpc>
-                          <a:spcPct val="100000"/>
-                        </a:lnSpc>
-                        <a:buClr>
-                          <a:srgbClr val="000000"/>
-                        </a:buClr>
-                        <a:buFont typeface="Wingdings" charset="2"/>
-                        <a:buChar char=""/>
-                      </a:pPr>
-                      <a:r>
-                        <a:rPr lang="pt-BR" sz="1320" b="0" strike="noStrike" spc="-1" dirty="0">
-                          <a:solidFill>
-                            <a:srgbClr val="000000"/>
-                          </a:solidFill>
-                          <a:latin typeface="Exo 2 Medium"/>
-                        </a:rPr>
-                        <a:t>Criação de missão, visão e valores # Grupo</a:t>
-                      </a:r>
-                    </a:p>
-                    <a:p>
-                      <a:pPr marL="432000" lvl="1" indent="-251280">
-                        <a:lnSpc>
-                          <a:spcPct val="100000"/>
-                        </a:lnSpc>
-                        <a:buClr>
-                          <a:srgbClr val="000000"/>
-                        </a:buClr>
-                        <a:buFont typeface="Wingdings" charset="2"/>
-                        <a:buChar char=""/>
-                      </a:pPr>
                       <a:endParaRPr lang="pt-BR" sz="1320" b="0" strike="noStrike" spc="-1" dirty="0">
                         <a:latin typeface="Arial"/>
                       </a:endParaRPr>
@@ -8232,25 +8339,6 @@
             <a:noAutofit/>
           </a:bodyPr>
           <a:lstStyle/>
-          <a:p>
-            <a:pPr>
-              <a:lnSpc>
-                <a:spcPct val="100000"/>
-              </a:lnSpc>
-            </a:pPr>
-            <a:r>
-              <a:rPr lang="pt-BR" sz="1330" b="1" strike="noStrike" spc="-1" dirty="0">
-                <a:solidFill>
-                  <a:srgbClr val="000000"/>
-                </a:solidFill>
-                <a:latin typeface="Exo 2 Medium"/>
-              </a:rPr>
-              <a:t>- Conta da Cloud (Falar com o professor)</a:t>
-            </a:r>
-            <a:endParaRPr lang="pt-BR" sz="1330" b="0" strike="noStrike" spc="-1" dirty="0">
-              <a:latin typeface="Arial"/>
-            </a:endParaRPr>
-          </a:p>
           <a:p>
             <a:pPr>
               <a:lnSpc>

</xml_diff>